<commit_message>
Apply same finding-customers fix to Powerpoint
</commit_message>
<xml_diff>
--- a/finding-customers/2024-05.pptx
+++ b/finding-customers/2024-05.pptx
@@ -5,7 +5,7 @@
     <p:sldMasterId id="2147483648" r:id="rId1"/>
   </p:sldMasterIdLst>
   <p:notesMasterIdLst>
-    <p:notesMasterId r:id="rId41"/>
+    <p:notesMasterId r:id="rId47"/>
   </p:notesMasterIdLst>
   <p:sldIdLst>
     <p:sldId id="256" r:id="rId2"/>
@@ -47,6 +47,12 @@
     <p:sldId id="292" r:id="rId38"/>
     <p:sldId id="293" r:id="rId39"/>
     <p:sldId id="294" r:id="rId40"/>
+    <p:sldId id="295" r:id="rId41"/>
+    <p:sldId id="296" r:id="rId42"/>
+    <p:sldId id="297" r:id="rId43"/>
+    <p:sldId id="298" r:id="rId44"/>
+    <p:sldId id="299" r:id="rId45"/>
+    <p:sldId id="300" r:id="rId46"/>
   </p:sldIdLst>
   <p:sldSz cx="9144000" cy="5143500" type="screen16x9"/>
   <p:notesSz cx="6858000" cy="9144000"/>
@@ -3698,6 +3704,34 @@
             </a:pPr>
             <a:r>
               <a:rPr/>
+              <a:t>Watch out for hobby shopping. Hobby shopping is a that I learned when I was working at a government research laboratory. It is when you use government funds to work on things that you find interesting, but which have no value for the research mission of the laboratory.</a:t>
+            </a:r>
+          </a:p>
+          <a:p>
+            <a:pPr lvl="0" indent="0" marL="0">
+              <a:buNone/>
+            </a:pPr>
+          </a:p>
+          <a:p>
+            <a:pPr lvl="0" indent="0" marL="0">
+              <a:buNone/>
+            </a:pPr>
+            <a:r>
+              <a:rPr/>
+              <a:t>As a consultant, you have to give the client what they want and what they need. But if you want to try a new approach just because it looks fun, resist the temptation. Or do the work on your own dime.</a:t>
+            </a:r>
+          </a:p>
+          <a:p>
+            <a:pPr lvl="0" indent="0" marL="0">
+              <a:buNone/>
+            </a:pPr>
+          </a:p>
+          <a:p>
+            <a:pPr lvl="0" indent="0" marL="0">
+              <a:buNone/>
+            </a:pPr>
+            <a:r>
+              <a:rPr/>
               <a:t>Be honest with your client. They may have high expectations from your work, but let them know that sometimes a study is a bust with all the p-values larger than 0.05. Yes, I know that negative studies are just as valuable as positive studies. But if your client has pie-in-the-sky expectations, you want to give then an early dose of the reality of statistics, especially if their sample size is quite marginal.</a:t>
             </a:r>
           </a:p>
@@ -3712,7 +3746,7 @@
             </a:pPr>
             <a:r>
               <a:rPr/>
-              <a:t>The other thing that I do believe quite strongly helps in keeping customers is to make them less dependent on you. Teach them how to do some of the basic analyses themselves. Show them how to choose among competing methods. For some clients this will actually bring them back to you more often because they enjoy developing a sense of self mastery. You get the side benefit that when they do see you, they present not the boring mundance simple stuff but the challenging problems that they still are unable to master.</a:t>
+              <a:t>The other thing that I do believe quite strongly helps in keeping customers is to make them less dependent on you. Teach them how to do some of the basic analyses themselves. Show them how to choose among competing methods. For some clients this will actually bring them back to you more often because they enjoy developing a sense of self mastery. You get the side benefit that when they do see you, they present not the boring stuff, not the mundane stuff, not the simple stuff/ They eventually end up presenting the really challenging stuff-problems that they still are unable to master. That’s when things get really fun.</a:t>
             </a:r>
           </a:p>
         </p:txBody>
@@ -3794,21 +3828,7 @@
             </a:pPr>
             <a:r>
               <a:rPr/>
-              <a:t>This is my last slide. Are there are any questions?</a:t>
-            </a:r>
-          </a:p>
-          <a:p>
-            <a:pPr lvl="0" indent="0" marL="0">
-              <a:buNone/>
-            </a:pPr>
-          </a:p>
-          <a:p>
-            <a:pPr lvl="0" indent="0" marL="0">
-              <a:buNone/>
-            </a:pPr>
-            <a:r>
-              <a:rPr/>
-              <a:t>I’d also like to open the floor for others to comment.</a:t>
+              <a:t>If you want to get clients for your new consulting business, the first thing you need to do is to use word of mouth.</a:t>
             </a:r>
           </a:p>
         </p:txBody>
@@ -3831,6 +3851,252 @@
             <a:fld id="{18BDFEC3-8487-43E8-A154-7C12CBC1FFF2}" type="slidenum">
               <a:rPr lang="en-US"/>
               <a:t>39</a:t>
+            </a:fld>
+            <a:endParaRPr lang="en-US"/>
+          </a:p>
+        </p:txBody>
+      </p:sp>
+    </p:spTree>
+  </p:cSld>
+</p:notes>
+</file>
+
+<file path=ppt/notesSlides/notesSlide37.xml><?xml version="1.0" encoding="utf-8"?>
+<p:notes xmlns:a="http://schemas.openxmlformats.org/drawingml/2006/main" xmlns:r="http://schemas.openxmlformats.org/officeDocument/2006/relationships" xmlns:p="http://schemas.openxmlformats.org/presentationml/2006/main">
+  <p:cSld>
+    <p:spTree>
+      <p:nvGrpSpPr>
+        <p:cNvPr id="1" name=""/>
+        <p:cNvGrpSpPr/>
+        <p:nvPr/>
+      </p:nvGrpSpPr>
+      <p:grpSpPr>
+        <a:xfrm>
+          <a:off x="0" y="0"/>
+          <a:ext cx="0" cy="0"/>
+          <a:chOff x="0" y="0"/>
+          <a:chExt cx="0" cy="0"/>
+        </a:xfrm>
+      </p:grpSpPr>
+      <p:sp>
+        <p:nvSpPr>
+          <p:cNvPr id="2" name="Slide Image Placeholder 1"/>
+          <p:cNvSpPr>
+            <a:spLocks noGrp="1" noRot="1" noChangeAspect="1"/>
+          </p:cNvSpPr>
+          <p:nvPr>
+            <p:ph type="sldImg"/>
+          </p:nvPr>
+        </p:nvSpPr>
+        <p:spPr/>
+      </p:sp>
+      <p:sp>
+        <p:nvSpPr>
+          <p:cNvPr id="3" name="Notes Placeholder 2"/>
+          <p:cNvSpPr>
+            <a:spLocks noGrp="1"/>
+          </p:cNvSpPr>
+          <p:nvPr>
+            <p:ph type="body" idx="1"/>
+          </p:nvPr>
+        </p:nvSpPr>
+        <p:spPr/>
+        <p:txBody>
+          <a:bodyPr/>
+          <a:lstStyle/>
+          <a:p>
+            <a:pPr lvl="0" indent="0" marL="0">
+              <a:buNone/>
+            </a:pPr>
+            <a:r>
+              <a:rPr/>
+              <a:t>You should give away free samples of your work</a:t>
+            </a:r>
+          </a:p>
+        </p:txBody>
+      </p:sp>
+      <p:sp>
+        <p:nvSpPr>
+          <p:cNvPr id="4" name="Slide Number Placeholder 3"/>
+          <p:cNvSpPr>
+            <a:spLocks noGrp="1"/>
+          </p:cNvSpPr>
+          <p:nvPr>
+            <p:ph type="sldNum" sz="quarter" idx="10"/>
+          </p:nvPr>
+        </p:nvSpPr>
+        <p:spPr/>
+        <p:txBody>
+          <a:bodyPr/>
+          <a:lstStyle/>
+          <a:p>
+            <a:fld id="{18BDFEC3-8487-43E8-A154-7C12CBC1FFF2}" type="slidenum">
+              <a:rPr lang="en-US"/>
+              <a:t>40</a:t>
+            </a:fld>
+            <a:endParaRPr lang="en-US"/>
+          </a:p>
+        </p:txBody>
+      </p:sp>
+    </p:spTree>
+  </p:cSld>
+</p:notes>
+</file>
+
+<file path=ppt/notesSlides/notesSlide38.xml><?xml version="1.0" encoding="utf-8"?>
+<p:notes xmlns:a="http://schemas.openxmlformats.org/drawingml/2006/main" xmlns:r="http://schemas.openxmlformats.org/officeDocument/2006/relationships" xmlns:p="http://schemas.openxmlformats.org/presentationml/2006/main">
+  <p:cSld>
+    <p:spTree>
+      <p:nvGrpSpPr>
+        <p:cNvPr id="1" name=""/>
+        <p:cNvGrpSpPr/>
+        <p:nvPr/>
+      </p:nvGrpSpPr>
+      <p:grpSpPr>
+        <a:xfrm>
+          <a:off x="0" y="0"/>
+          <a:ext cx="0" cy="0"/>
+          <a:chOff x="0" y="0"/>
+          <a:chExt cx="0" cy="0"/>
+        </a:xfrm>
+      </p:grpSpPr>
+      <p:sp>
+        <p:nvSpPr>
+          <p:cNvPr id="2" name="Slide Image Placeholder 1"/>
+          <p:cNvSpPr>
+            <a:spLocks noGrp="1" noRot="1" noChangeAspect="1"/>
+          </p:cNvSpPr>
+          <p:nvPr>
+            <p:ph type="sldImg"/>
+          </p:nvPr>
+        </p:nvSpPr>
+        <p:spPr/>
+      </p:sp>
+      <p:sp>
+        <p:nvSpPr>
+          <p:cNvPr id="3" name="Notes Placeholder 2"/>
+          <p:cNvSpPr>
+            <a:spLocks noGrp="1"/>
+          </p:cNvSpPr>
+          <p:nvPr>
+            <p:ph type="body" idx="1"/>
+          </p:nvPr>
+        </p:nvSpPr>
+        <p:spPr/>
+        <p:txBody>
+          <a:bodyPr/>
+          <a:lstStyle/>
+          <a:p>
+            <a:pPr lvl="0" indent="0" marL="0">
+              <a:buNone/>
+            </a:pPr>
+            <a:r>
+              <a:rPr/>
+              <a:t>Consider volunteering</a:t>
+            </a:r>
+          </a:p>
+        </p:txBody>
+      </p:sp>
+      <p:sp>
+        <p:nvSpPr>
+          <p:cNvPr id="4" name="Slide Number Placeholder 3"/>
+          <p:cNvSpPr>
+            <a:spLocks noGrp="1"/>
+          </p:cNvSpPr>
+          <p:nvPr>
+            <p:ph type="sldNum" sz="quarter" idx="10"/>
+          </p:nvPr>
+        </p:nvSpPr>
+        <p:spPr/>
+        <p:txBody>
+          <a:bodyPr/>
+          <a:lstStyle/>
+          <a:p>
+            <a:fld id="{18BDFEC3-8487-43E8-A154-7C12CBC1FFF2}" type="slidenum">
+              <a:rPr lang="en-US"/>
+              <a:t>41</a:t>
+            </a:fld>
+            <a:endParaRPr lang="en-US"/>
+          </a:p>
+        </p:txBody>
+      </p:sp>
+    </p:spTree>
+  </p:cSld>
+</p:notes>
+</file>
+
+<file path=ppt/notesSlides/notesSlide39.xml><?xml version="1.0" encoding="utf-8"?>
+<p:notes xmlns:a="http://schemas.openxmlformats.org/drawingml/2006/main" xmlns:r="http://schemas.openxmlformats.org/officeDocument/2006/relationships" xmlns:p="http://schemas.openxmlformats.org/presentationml/2006/main">
+  <p:cSld>
+    <p:spTree>
+      <p:nvGrpSpPr>
+        <p:cNvPr id="1" name=""/>
+        <p:cNvGrpSpPr/>
+        <p:nvPr/>
+      </p:nvGrpSpPr>
+      <p:grpSpPr>
+        <a:xfrm>
+          <a:off x="0" y="0"/>
+          <a:ext cx="0" cy="0"/>
+          <a:chOff x="0" y="0"/>
+          <a:chExt cx="0" cy="0"/>
+        </a:xfrm>
+      </p:grpSpPr>
+      <p:sp>
+        <p:nvSpPr>
+          <p:cNvPr id="2" name="Slide Image Placeholder 1"/>
+          <p:cNvSpPr>
+            <a:spLocks noGrp="1" noRot="1" noChangeAspect="1"/>
+          </p:cNvSpPr>
+          <p:nvPr>
+            <p:ph type="sldImg"/>
+          </p:nvPr>
+        </p:nvSpPr>
+        <p:spPr/>
+      </p:sp>
+      <p:sp>
+        <p:nvSpPr>
+          <p:cNvPr id="3" name="Notes Placeholder 2"/>
+          <p:cNvSpPr>
+            <a:spLocks noGrp="1"/>
+          </p:cNvSpPr>
+          <p:nvPr>
+            <p:ph type="body" idx="1"/>
+          </p:nvPr>
+        </p:nvSpPr>
+        <p:spPr/>
+        <p:txBody>
+          <a:bodyPr/>
+          <a:lstStyle/>
+          <a:p>
+            <a:pPr lvl="0" indent="0" marL="0">
+              <a:buNone/>
+            </a:pPr>
+            <a:r>
+              <a:rPr/>
+              <a:t>You will get more customers if you have a variety of ways that your customers can contact you.</a:t>
+            </a:r>
+          </a:p>
+        </p:txBody>
+      </p:sp>
+      <p:sp>
+        <p:nvSpPr>
+          <p:cNvPr id="4" name="Slide Number Placeholder 3"/>
+          <p:cNvSpPr>
+            <a:spLocks noGrp="1"/>
+          </p:cNvSpPr>
+          <p:nvPr>
+            <p:ph type="sldNum" sz="quarter" idx="10"/>
+          </p:nvPr>
+        </p:nvSpPr>
+        <p:spPr/>
+        <p:txBody>
+          <a:bodyPr/>
+          <a:lstStyle/>
+          <a:p>
+            <a:fld id="{18BDFEC3-8487-43E8-A154-7C12CBC1FFF2}" type="slidenum">
+              <a:rPr lang="en-US"/>
+              <a:t>42</a:t>
             </a:fld>
             <a:endParaRPr lang="en-US"/>
           </a:p>
@@ -3941,6 +4207,266 @@
             <a:fld id="{18BDFEC3-8487-43E8-A154-7C12CBC1FFF2}" type="slidenum">
               <a:rPr lang="en-US"/>
               <a:t>5</a:t>
+            </a:fld>
+            <a:endParaRPr lang="en-US"/>
+          </a:p>
+        </p:txBody>
+      </p:sp>
+    </p:spTree>
+  </p:cSld>
+</p:notes>
+</file>
+
+<file path=ppt/notesSlides/notesSlide40.xml><?xml version="1.0" encoding="utf-8"?>
+<p:notes xmlns:a="http://schemas.openxmlformats.org/drawingml/2006/main" xmlns:r="http://schemas.openxmlformats.org/officeDocument/2006/relationships" xmlns:p="http://schemas.openxmlformats.org/presentationml/2006/main">
+  <p:cSld>
+    <p:spTree>
+      <p:nvGrpSpPr>
+        <p:cNvPr id="1" name=""/>
+        <p:cNvGrpSpPr/>
+        <p:nvPr/>
+      </p:nvGrpSpPr>
+      <p:grpSpPr>
+        <a:xfrm>
+          <a:off x="0" y="0"/>
+          <a:ext cx="0" cy="0"/>
+          <a:chOff x="0" y="0"/>
+          <a:chExt cx="0" cy="0"/>
+        </a:xfrm>
+      </p:grpSpPr>
+      <p:sp>
+        <p:nvSpPr>
+          <p:cNvPr id="2" name="Slide Image Placeholder 1"/>
+          <p:cNvSpPr>
+            <a:spLocks noGrp="1" noRot="1" noChangeAspect="1"/>
+          </p:cNvSpPr>
+          <p:nvPr>
+            <p:ph type="sldImg"/>
+          </p:nvPr>
+        </p:nvSpPr>
+        <p:spPr/>
+      </p:sp>
+      <p:sp>
+        <p:nvSpPr>
+          <p:cNvPr id="3" name="Notes Placeholder 2"/>
+          <p:cNvSpPr>
+            <a:spLocks noGrp="1"/>
+          </p:cNvSpPr>
+          <p:nvPr>
+            <p:ph type="body" idx="1"/>
+          </p:nvPr>
+        </p:nvSpPr>
+        <p:spPr/>
+        <p:txBody>
+          <a:bodyPr/>
+          <a:lstStyle/>
+          <a:p>
+            <a:pPr lvl="0" indent="0" marL="0">
+              <a:buNone/>
+            </a:pPr>
+            <a:r>
+              <a:rPr/>
+              <a:t>Make these efforts a work habit, one that you do regularly but you also pace yourself so you don’t burn out.</a:t>
+            </a:r>
+          </a:p>
+        </p:txBody>
+      </p:sp>
+      <p:sp>
+        <p:nvSpPr>
+          <p:cNvPr id="4" name="Slide Number Placeholder 3"/>
+          <p:cNvSpPr>
+            <a:spLocks noGrp="1"/>
+          </p:cNvSpPr>
+          <p:nvPr>
+            <p:ph type="sldNum" sz="quarter" idx="10"/>
+          </p:nvPr>
+        </p:nvSpPr>
+        <p:spPr/>
+        <p:txBody>
+          <a:bodyPr/>
+          <a:lstStyle/>
+          <a:p>
+            <a:fld id="{18BDFEC3-8487-43E8-A154-7C12CBC1FFF2}" type="slidenum">
+              <a:rPr lang="en-US"/>
+              <a:t>43</a:t>
+            </a:fld>
+            <a:endParaRPr lang="en-US"/>
+          </a:p>
+        </p:txBody>
+      </p:sp>
+    </p:spTree>
+  </p:cSld>
+</p:notes>
+</file>
+
+<file path=ppt/notesSlides/notesSlide41.xml><?xml version="1.0" encoding="utf-8"?>
+<p:notes xmlns:a="http://schemas.openxmlformats.org/drawingml/2006/main" xmlns:r="http://schemas.openxmlformats.org/officeDocument/2006/relationships" xmlns:p="http://schemas.openxmlformats.org/presentationml/2006/main">
+  <p:cSld>
+    <p:spTree>
+      <p:nvGrpSpPr>
+        <p:cNvPr id="1" name=""/>
+        <p:cNvGrpSpPr/>
+        <p:nvPr/>
+      </p:nvGrpSpPr>
+      <p:grpSpPr>
+        <a:xfrm>
+          <a:off x="0" y="0"/>
+          <a:ext cx="0" cy="0"/>
+          <a:chOff x="0" y="0"/>
+          <a:chExt cx="0" cy="0"/>
+        </a:xfrm>
+      </p:grpSpPr>
+      <p:sp>
+        <p:nvSpPr>
+          <p:cNvPr id="2" name="Slide Image Placeholder 1"/>
+          <p:cNvSpPr>
+            <a:spLocks noGrp="1" noRot="1" noChangeAspect="1"/>
+          </p:cNvSpPr>
+          <p:nvPr>
+            <p:ph type="sldImg"/>
+          </p:nvPr>
+        </p:nvSpPr>
+        <p:spPr/>
+      </p:sp>
+      <p:sp>
+        <p:nvSpPr>
+          <p:cNvPr id="3" name="Notes Placeholder 2"/>
+          <p:cNvSpPr>
+            <a:spLocks noGrp="1"/>
+          </p:cNvSpPr>
+          <p:nvPr>
+            <p:ph type="body" idx="1"/>
+          </p:nvPr>
+        </p:nvSpPr>
+        <p:spPr/>
+        <p:txBody>
+          <a:bodyPr/>
+          <a:lstStyle/>
+          <a:p>
+            <a:pPr lvl="0" indent="0" marL="0">
+              <a:buNone/>
+            </a:pPr>
+            <a:r>
+              <a:rPr/>
+              <a:t>Finally, once you have a good customer, keep them happy so that they will continue to want to work with you.</a:t>
+            </a:r>
+          </a:p>
+        </p:txBody>
+      </p:sp>
+      <p:sp>
+        <p:nvSpPr>
+          <p:cNvPr id="4" name="Slide Number Placeholder 3"/>
+          <p:cNvSpPr>
+            <a:spLocks noGrp="1"/>
+          </p:cNvSpPr>
+          <p:nvPr>
+            <p:ph type="sldNum" sz="quarter" idx="10"/>
+          </p:nvPr>
+        </p:nvSpPr>
+        <p:spPr/>
+        <p:txBody>
+          <a:bodyPr/>
+          <a:lstStyle/>
+          <a:p>
+            <a:fld id="{18BDFEC3-8487-43E8-A154-7C12CBC1FFF2}" type="slidenum">
+              <a:rPr lang="en-US"/>
+              <a:t>44</a:t>
+            </a:fld>
+            <a:endParaRPr lang="en-US"/>
+          </a:p>
+        </p:txBody>
+      </p:sp>
+    </p:spTree>
+  </p:cSld>
+</p:notes>
+</file>
+
+<file path=ppt/notesSlides/notesSlide42.xml><?xml version="1.0" encoding="utf-8"?>
+<p:notes xmlns:a="http://schemas.openxmlformats.org/drawingml/2006/main" xmlns:r="http://schemas.openxmlformats.org/officeDocument/2006/relationships" xmlns:p="http://schemas.openxmlformats.org/presentationml/2006/main">
+  <p:cSld>
+    <p:spTree>
+      <p:nvGrpSpPr>
+        <p:cNvPr id="1" name=""/>
+        <p:cNvGrpSpPr/>
+        <p:nvPr/>
+      </p:nvGrpSpPr>
+      <p:grpSpPr>
+        <a:xfrm>
+          <a:off x="0" y="0"/>
+          <a:ext cx="0" cy="0"/>
+          <a:chOff x="0" y="0"/>
+          <a:chExt cx="0" cy="0"/>
+        </a:xfrm>
+      </p:grpSpPr>
+      <p:sp>
+        <p:nvSpPr>
+          <p:cNvPr id="2" name="Slide Image Placeholder 1"/>
+          <p:cNvSpPr>
+            <a:spLocks noGrp="1" noRot="1" noChangeAspect="1"/>
+          </p:cNvSpPr>
+          <p:nvPr>
+            <p:ph type="sldImg"/>
+          </p:nvPr>
+        </p:nvSpPr>
+        <p:spPr/>
+      </p:sp>
+      <p:sp>
+        <p:nvSpPr>
+          <p:cNvPr id="3" name="Notes Placeholder 2"/>
+          <p:cNvSpPr>
+            <a:spLocks noGrp="1"/>
+          </p:cNvSpPr>
+          <p:nvPr>
+            <p:ph type="body" idx="1"/>
+          </p:nvPr>
+        </p:nvSpPr>
+        <p:spPr/>
+        <p:txBody>
+          <a:bodyPr/>
+          <a:lstStyle/>
+          <a:p>
+            <a:pPr lvl="0" indent="0" marL="0">
+              <a:buNone/>
+            </a:pPr>
+            <a:r>
+              <a:rPr/>
+              <a:t>This is my last slide. Are there are any questions?</a:t>
+            </a:r>
+          </a:p>
+          <a:p>
+            <a:pPr lvl="0" indent="0" marL="0">
+              <a:buNone/>
+            </a:pPr>
+          </a:p>
+          <a:p>
+            <a:pPr lvl="0" indent="0" marL="0">
+              <a:buNone/>
+            </a:pPr>
+            <a:r>
+              <a:rPr/>
+              <a:t>I’d also like to open the floor for others to comment.</a:t>
+            </a:r>
+          </a:p>
+        </p:txBody>
+      </p:sp>
+      <p:sp>
+        <p:nvSpPr>
+          <p:cNvPr id="4" name="Slide Number Placeholder 3"/>
+          <p:cNvSpPr>
+            <a:spLocks noGrp="1"/>
+          </p:cNvSpPr>
+          <p:nvPr>
+            <p:ph type="sldNum" sz="quarter" idx="10"/>
+          </p:nvPr>
+        </p:nvSpPr>
+        <p:spPr/>
+        <p:txBody>
+          <a:bodyPr/>
+          <a:lstStyle/>
+          <a:p>
+            <a:fld id="{18BDFEC3-8487-43E8-A154-7C12CBC1FFF2}" type="slidenum">
+              <a:rPr lang="en-US"/>
+              <a:t>45</a:t>
             </a:fld>
             <a:endParaRPr lang="en-US"/>
           </a:p>
@@ -7750,7 +8276,7 @@
       </p:sp>
       <p:pic>
         <p:nvPicPr>
-          <p:cNvPr descr="Charlie (Peter Ostrum) finding a golden ticker in Willy Wonka and the Chocolate Factory  golden-ticket.png" id="0" name="Picture 1"/>
+          <p:cNvPr descr="Charlie (Peter Ostrum) finding a golden ticket in Willy Wonka and the Chocolate Factory  golden-ticket.png" id="0" name="Picture 1"/>
           <p:cNvPicPr>
             <a:picLocks noGrp="1" noChangeAspect="1"/>
           </p:cNvPicPr>
@@ -8582,7 +9108,7 @@
             <a:pPr lvl="1"/>
             <a:r>
               <a:rPr/>
-              <a:t>Recognize that not everyone will find you by email</a:t>
+              <a:t>Recognize that not everyone will contact you by email</a:t>
             </a:r>
           </a:p>
           <a:p>
@@ -9410,7 +9936,7 @@
             <a:pPr lvl="1"/>
             <a:r>
               <a:rPr/>
-              <a:t>Recognize that not everyone will find you by email</a:t>
+              <a:t>Recognize that not everyone will contact you by email</a:t>
             </a:r>
           </a:p>
           <a:p>
@@ -9625,7 +10151,7 @@
             </a:pPr>
             <a:r>
               <a:rPr/>
-              <a:t>Recognize that not everyone will find you by email</a:t>
+              <a:t>Recognize that not everyone will contact you by email</a:t>
             </a:r>
           </a:p>
         </p:txBody>
@@ -9830,7 +10356,7 @@
             <a:pPr lvl="1"/>
             <a:r>
               <a:rPr/>
-              <a:t>Recognize that not everyone will find you by email</a:t>
+              <a:t>Recognize that not everyone will contact you by email</a:t>
             </a:r>
           </a:p>
           <a:p>
@@ -10185,7 +10711,7 @@
       </p:sp>
       <p:pic>
         <p:nvPicPr>
-          <p:cNvPr descr="Image of Anton Ego (voiced by Peter O'Toole) in the movie Ratatouille  ratatouille.png" id="0" name="Picture 1"/>
+          <p:cNvPr descr="Anton Ego (voiced by Peter O'Toole) in the movie Ratatouille  ratatouille.png" id="0" name="Picture 1"/>
           <p:cNvPicPr>
             <a:picLocks noGrp="1" noChangeAspect="1"/>
           </p:cNvPicPr>
@@ -10255,7 +10781,7 @@
             </a:pPr>
             <a:r>
               <a:rPr/>
-              <a:t>Keeping your existing customers happy</a:t>
+              <a:t>Keep your existing customers happy</a:t>
             </a:r>
           </a:p>
         </p:txBody>
@@ -10369,7 +10895,14 @@
             <a:pPr lvl="0"/>
             <a:r>
               <a:rPr/>
-              <a:t>Bill regulary</a:t>
+              <a:t>Bill regularly</a:t>
+            </a:r>
+          </a:p>
+          <a:p>
+            <a:pPr lvl="0"/>
+            <a:r>
+              <a:rPr/>
+              <a:t>Avoid hobby-shopping</a:t>
             </a:r>
           </a:p>
           <a:p>
@@ -10430,90 +10963,41 @@
             </a:pPr>
             <a:r>
               <a:rPr/>
-              <a:t>Summary</a:t>
-            </a:r>
-          </a:p>
-        </p:txBody>
-      </p:sp>
-      <p:sp>
-        <p:nvSpPr>
-          <p:cNvPr id="3" name="Content Placeholder 2"/>
-          <p:cNvSpPr>
-            <a:spLocks noGrp="1"/>
-          </p:cNvSpPr>
-          <p:nvPr>
-            <p:ph idx="1"/>
-          </p:nvPr>
-        </p:nvSpPr>
-        <p:spPr/>
-        <p:txBody>
-          <a:bodyPr/>
-          <a:lstStyle/>
-          <a:p>
-            <a:pPr lvl="0"/>
-            <a:r>
-              <a:rPr/>
-              <a:t>What you have learned</a:t>
-            </a:r>
-          </a:p>
-          <a:p>
-            <a:pPr lvl="1"/>
-            <a:r>
-              <a:rPr/>
               <a:t>Use word of mouth</a:t>
             </a:r>
           </a:p>
-          <a:p>
-            <a:pPr lvl="1"/>
-            <a:r>
-              <a:rPr/>
-              <a:t>Give away free samples of your work</a:t>
-            </a:r>
-          </a:p>
-          <a:p>
-            <a:pPr lvl="1"/>
-            <a:r>
-              <a:rPr/>
-              <a:t>Consider volunteering</a:t>
-            </a:r>
-          </a:p>
-          <a:p>
-            <a:pPr lvl="1"/>
-            <a:r>
-              <a:rPr/>
-              <a:t>Recognize that not everyone will find you by email</a:t>
-            </a:r>
-          </a:p>
-          <a:p>
-            <a:pPr lvl="1"/>
-            <a:r>
-              <a:rPr/>
-              <a:t>Turn all of these efforts into a regular work habit</a:t>
-            </a:r>
-          </a:p>
-          <a:p>
-            <a:pPr lvl="1"/>
-            <a:r>
-              <a:rPr/>
-              <a:t>Addendum: Keeping your existing customers happy</a:t>
-            </a:r>
-          </a:p>
-          <a:p>
-            <a:pPr lvl="0"/>
-            <a:r>
-              <a:rPr/>
-              <a:t>Any questions?</a:t>
-            </a:r>
-          </a:p>
-          <a:p>
-            <a:pPr lvl="0"/>
-            <a:r>
-              <a:rPr/>
-              <a:t>What have you found helpful?</a:t>
-            </a:r>
-          </a:p>
-        </p:txBody>
-      </p:sp>
+        </p:txBody>
+      </p:sp>
+      <p:pic>
+        <p:nvPicPr>
+          <p:cNvPr descr="An annoying salesperson, Ned Ryerson, in the movie, Groundhog Day  ned-ryerson.png" id="0" name="Picture 1"/>
+          <p:cNvPicPr>
+            <a:picLocks noGrp="1" noChangeAspect="1"/>
+          </p:cNvPicPr>
+          <p:nvPr/>
+        </p:nvPicPr>
+        <p:blipFill>
+          <a:blip r:embed="rId3"/>
+          <a:stretch>
+            <a:fillRect/>
+          </a:stretch>
+        </p:blipFill>
+        <p:spPr bwMode="auto">
+          <a:xfrm>
+            <a:off x="2032000" y="1193800"/>
+            <a:ext cx="5080000" cy="3390900"/>
+          </a:xfrm>
+          <a:prstGeom prst="rect">
+            <a:avLst/>
+          </a:prstGeom>
+          <a:noFill/>
+          <a:ln w="9525">
+            <a:noFill/>
+            <a:headEnd/>
+            <a:tailEnd/>
+          </a:ln>
+        </p:spPr>
+      </p:pic>
     </p:spTree>
   </p:cSld>
 </p:sld>
@@ -10594,6 +11078,517 @@
             <a:r>
               <a:rPr/>
               <a:t>Staying in touch</a:t>
+            </a:r>
+          </a:p>
+        </p:txBody>
+      </p:sp>
+    </p:spTree>
+  </p:cSld>
+</p:sld>
+</file>
+
+<file path=ppt/slides/slide40.xml><?xml version="1.0" encoding="utf-8"?>
+<p:sld xmlns:a="http://schemas.openxmlformats.org/drawingml/2006/main" xmlns:r="http://schemas.openxmlformats.org/officeDocument/2006/relationships" xmlns:p="http://schemas.openxmlformats.org/presentationml/2006/main">
+  <p:cSld>
+    <p:spTree>
+      <p:nvGrpSpPr>
+        <p:cNvPr id="1" name=""/>
+        <p:cNvGrpSpPr/>
+        <p:nvPr/>
+      </p:nvGrpSpPr>
+      <p:grpSpPr>
+        <a:xfrm>
+          <a:off x="0" y="0"/>
+          <a:ext cx="0" cy="0"/>
+          <a:chOff x="0" y="0"/>
+          <a:chExt cx="0" cy="0"/>
+        </a:xfrm>
+      </p:grpSpPr>
+      <p:sp>
+        <p:nvSpPr>
+          <p:cNvPr id="2" name="Title 1"/>
+          <p:cNvSpPr>
+            <a:spLocks noGrp="1"/>
+          </p:cNvSpPr>
+          <p:nvPr>
+            <p:ph type="title"/>
+          </p:nvPr>
+        </p:nvSpPr>
+        <p:spPr/>
+        <p:txBody>
+          <a:bodyPr/>
+          <a:lstStyle/>
+          <a:p>
+            <a:pPr lvl="0" indent="0" marL="0">
+              <a:buNone/>
+            </a:pPr>
+            <a:r>
+              <a:rPr/>
+              <a:t>Give away free samples of your work</a:t>
+            </a:r>
+          </a:p>
+        </p:txBody>
+      </p:sp>
+      <p:pic>
+        <p:nvPicPr>
+          <p:cNvPr descr="Charlie (Peter Ostrum) finding a golden ticket in Willy Wonka and the Chocolate Factory  golden-ticket.png" id="0" name="Picture 1"/>
+          <p:cNvPicPr>
+            <a:picLocks noGrp="1" noChangeAspect="1"/>
+          </p:cNvPicPr>
+          <p:nvPr/>
+        </p:nvPicPr>
+        <p:blipFill>
+          <a:blip r:embed="rId3"/>
+          <a:stretch>
+            <a:fillRect/>
+          </a:stretch>
+        </p:blipFill>
+        <p:spPr bwMode="auto">
+          <a:xfrm>
+            <a:off x="3124200" y="1193800"/>
+            <a:ext cx="2908300" cy="3390900"/>
+          </a:xfrm>
+          <a:prstGeom prst="rect">
+            <a:avLst/>
+          </a:prstGeom>
+          <a:noFill/>
+          <a:ln w="9525">
+            <a:noFill/>
+            <a:headEnd/>
+            <a:tailEnd/>
+          </a:ln>
+        </p:spPr>
+      </p:pic>
+    </p:spTree>
+  </p:cSld>
+</p:sld>
+</file>
+
+<file path=ppt/slides/slide41.xml><?xml version="1.0" encoding="utf-8"?>
+<p:sld xmlns:a="http://schemas.openxmlformats.org/drawingml/2006/main" xmlns:r="http://schemas.openxmlformats.org/officeDocument/2006/relationships" xmlns:p="http://schemas.openxmlformats.org/presentationml/2006/main">
+  <p:cSld>
+    <p:spTree>
+      <p:nvGrpSpPr>
+        <p:cNvPr id="1" name=""/>
+        <p:cNvGrpSpPr/>
+        <p:nvPr/>
+      </p:nvGrpSpPr>
+      <p:grpSpPr>
+        <a:xfrm>
+          <a:off x="0" y="0"/>
+          <a:ext cx="0" cy="0"/>
+          <a:chOff x="0" y="0"/>
+          <a:chExt cx="0" cy="0"/>
+        </a:xfrm>
+      </p:grpSpPr>
+      <p:sp>
+        <p:nvSpPr>
+          <p:cNvPr id="2" name="Title 1"/>
+          <p:cNvSpPr>
+            <a:spLocks noGrp="1"/>
+          </p:cNvSpPr>
+          <p:nvPr>
+            <p:ph type="title"/>
+          </p:nvPr>
+        </p:nvSpPr>
+        <p:spPr/>
+        <p:txBody>
+          <a:bodyPr/>
+          <a:lstStyle/>
+          <a:p>
+            <a:pPr lvl="0" indent="0" marL="0">
+              <a:buNone/>
+            </a:pPr>
+            <a:r>
+              <a:rPr/>
+              <a:t>Consider volunteering</a:t>
+            </a:r>
+          </a:p>
+        </p:txBody>
+      </p:sp>
+      <p:pic>
+        <p:nvPicPr>
+          <p:cNvPr descr="Tracy Flick (Reese Witherspoon) from the movie, Election  election.png" id="0" name="Picture 1"/>
+          <p:cNvPicPr>
+            <a:picLocks noGrp="1" noChangeAspect="1"/>
+          </p:cNvPicPr>
+          <p:nvPr/>
+        </p:nvPicPr>
+        <p:blipFill>
+          <a:blip r:embed="rId3"/>
+          <a:stretch>
+            <a:fillRect/>
+          </a:stretch>
+        </p:blipFill>
+        <p:spPr bwMode="auto">
+          <a:xfrm>
+            <a:off x="2222500" y="1193800"/>
+            <a:ext cx="4711700" cy="3390900"/>
+          </a:xfrm>
+          <a:prstGeom prst="rect">
+            <a:avLst/>
+          </a:prstGeom>
+          <a:noFill/>
+          <a:ln w="9525">
+            <a:noFill/>
+            <a:headEnd/>
+            <a:tailEnd/>
+          </a:ln>
+        </p:spPr>
+      </p:pic>
+    </p:spTree>
+  </p:cSld>
+</p:sld>
+</file>
+
+<file path=ppt/slides/slide42.xml><?xml version="1.0" encoding="utf-8"?>
+<p:sld xmlns:a="http://schemas.openxmlformats.org/drawingml/2006/main" xmlns:r="http://schemas.openxmlformats.org/officeDocument/2006/relationships" xmlns:p="http://schemas.openxmlformats.org/presentationml/2006/main">
+  <p:cSld>
+    <p:spTree>
+      <p:nvGrpSpPr>
+        <p:cNvPr id="1" name=""/>
+        <p:cNvGrpSpPr/>
+        <p:nvPr/>
+      </p:nvGrpSpPr>
+      <p:grpSpPr>
+        <a:xfrm>
+          <a:off x="0" y="0"/>
+          <a:ext cx="0" cy="0"/>
+          <a:chOff x="0" y="0"/>
+          <a:chExt cx="0" cy="0"/>
+        </a:xfrm>
+      </p:grpSpPr>
+      <p:sp>
+        <p:nvSpPr>
+          <p:cNvPr id="2" name="Title 1"/>
+          <p:cNvSpPr>
+            <a:spLocks noGrp="1"/>
+          </p:cNvSpPr>
+          <p:nvPr>
+            <p:ph type="title"/>
+          </p:nvPr>
+        </p:nvSpPr>
+        <p:spPr/>
+        <p:txBody>
+          <a:bodyPr/>
+          <a:lstStyle/>
+          <a:p>
+            <a:pPr lvl="0" indent="0" marL="0">
+              <a:buNone/>
+            </a:pPr>
+            <a:r>
+              <a:rPr/>
+              <a:t>Recognize that not everyone will contact you by email</a:t>
+            </a:r>
+          </a:p>
+        </p:txBody>
+      </p:sp>
+      <p:pic>
+        <p:nvPicPr>
+          <p:cNvPr descr="Movie poster of Tom Hanks and Meg Ryan in You've Got Mail  youve-got-mail.png" id="0" name="Picture 1"/>
+          <p:cNvPicPr>
+            <a:picLocks noGrp="1" noChangeAspect="1"/>
+          </p:cNvPicPr>
+          <p:nvPr/>
+        </p:nvPicPr>
+        <p:blipFill>
+          <a:blip r:embed="rId3"/>
+          <a:stretch>
+            <a:fillRect/>
+          </a:stretch>
+        </p:blipFill>
+        <p:spPr bwMode="auto">
+          <a:xfrm>
+            <a:off x="2527300" y="1193800"/>
+            <a:ext cx="4076700" cy="3390900"/>
+          </a:xfrm>
+          <a:prstGeom prst="rect">
+            <a:avLst/>
+          </a:prstGeom>
+          <a:noFill/>
+          <a:ln w="9525">
+            <a:noFill/>
+            <a:headEnd/>
+            <a:tailEnd/>
+          </a:ln>
+        </p:spPr>
+      </p:pic>
+    </p:spTree>
+  </p:cSld>
+</p:sld>
+</file>
+
+<file path=ppt/slides/slide43.xml><?xml version="1.0" encoding="utf-8"?>
+<p:sld xmlns:a="http://schemas.openxmlformats.org/drawingml/2006/main" xmlns:r="http://schemas.openxmlformats.org/officeDocument/2006/relationships" xmlns:p="http://schemas.openxmlformats.org/presentationml/2006/main">
+  <p:cSld>
+    <p:spTree>
+      <p:nvGrpSpPr>
+        <p:cNvPr id="1" name=""/>
+        <p:cNvGrpSpPr/>
+        <p:nvPr/>
+      </p:nvGrpSpPr>
+      <p:grpSpPr>
+        <a:xfrm>
+          <a:off x="0" y="0"/>
+          <a:ext cx="0" cy="0"/>
+          <a:chOff x="0" y="0"/>
+          <a:chExt cx="0" cy="0"/>
+        </a:xfrm>
+      </p:grpSpPr>
+      <p:sp>
+        <p:nvSpPr>
+          <p:cNvPr id="2" name="Title 1"/>
+          <p:cNvSpPr>
+            <a:spLocks noGrp="1"/>
+          </p:cNvSpPr>
+          <p:nvPr>
+            <p:ph type="title"/>
+          </p:nvPr>
+        </p:nvSpPr>
+        <p:spPr/>
+        <p:txBody>
+          <a:bodyPr/>
+          <a:lstStyle/>
+          <a:p>
+            <a:pPr lvl="0" indent="0" marL="0">
+              <a:buNone/>
+            </a:pPr>
+            <a:r>
+              <a:rPr/>
+              <a:t>Turn all of these efforts into a regular work habit</a:t>
+            </a:r>
+          </a:p>
+        </p:txBody>
+      </p:sp>
+      <p:pic>
+        <p:nvPicPr>
+          <p:cNvPr descr="Sister Mary Clarence (Whoopi Goldberg) from the movie Sister Act  sister-act.png" id="0" name="Picture 1"/>
+          <p:cNvPicPr>
+            <a:picLocks noGrp="1" noChangeAspect="1"/>
+          </p:cNvPicPr>
+          <p:nvPr/>
+        </p:nvPicPr>
+        <p:blipFill>
+          <a:blip r:embed="rId3"/>
+          <a:stretch>
+            <a:fillRect/>
+          </a:stretch>
+        </p:blipFill>
+        <p:spPr bwMode="auto">
+          <a:xfrm>
+            <a:off x="3302000" y="1193800"/>
+            <a:ext cx="2552700" cy="3390900"/>
+          </a:xfrm>
+          <a:prstGeom prst="rect">
+            <a:avLst/>
+          </a:prstGeom>
+          <a:noFill/>
+          <a:ln w="9525">
+            <a:noFill/>
+            <a:headEnd/>
+            <a:tailEnd/>
+          </a:ln>
+        </p:spPr>
+      </p:pic>
+    </p:spTree>
+  </p:cSld>
+</p:sld>
+</file>
+
+<file path=ppt/slides/slide44.xml><?xml version="1.0" encoding="utf-8"?>
+<p:sld xmlns:a="http://schemas.openxmlformats.org/drawingml/2006/main" xmlns:r="http://schemas.openxmlformats.org/officeDocument/2006/relationships" xmlns:p="http://schemas.openxmlformats.org/presentationml/2006/main">
+  <p:cSld>
+    <p:spTree>
+      <p:nvGrpSpPr>
+        <p:cNvPr id="1" name=""/>
+        <p:cNvGrpSpPr/>
+        <p:nvPr/>
+      </p:nvGrpSpPr>
+      <p:grpSpPr>
+        <a:xfrm>
+          <a:off x="0" y="0"/>
+          <a:ext cx="0" cy="0"/>
+          <a:chOff x="0" y="0"/>
+          <a:chExt cx="0" cy="0"/>
+        </a:xfrm>
+      </p:grpSpPr>
+      <p:sp>
+        <p:nvSpPr>
+          <p:cNvPr id="2" name="Title 1"/>
+          <p:cNvSpPr>
+            <a:spLocks noGrp="1"/>
+          </p:cNvSpPr>
+          <p:nvPr>
+            <p:ph type="title"/>
+          </p:nvPr>
+        </p:nvSpPr>
+        <p:spPr/>
+        <p:txBody>
+          <a:bodyPr/>
+          <a:lstStyle/>
+          <a:p>
+            <a:pPr lvl="0" indent="0" marL="0">
+              <a:buNone/>
+            </a:pPr>
+            <a:r>
+              <a:rPr/>
+              <a:t>Keep your existing customers happy</a:t>
+            </a:r>
+          </a:p>
+        </p:txBody>
+      </p:sp>
+      <p:pic>
+        <p:nvPicPr>
+          <p:cNvPr descr="Anton Ego (voiced by Peter O'Toole) in the movie Ratatouille  ratatouille.png" id="0" name="Picture 1"/>
+          <p:cNvPicPr>
+            <a:picLocks noGrp="1" noChangeAspect="1"/>
+          </p:cNvPicPr>
+          <p:nvPr/>
+        </p:nvPicPr>
+        <p:blipFill>
+          <a:blip r:embed="rId3"/>
+          <a:stretch>
+            <a:fillRect/>
+          </a:stretch>
+        </p:blipFill>
+        <p:spPr bwMode="auto">
+          <a:xfrm>
+            <a:off x="1447800" y="1193800"/>
+            <a:ext cx="6248400" cy="3390900"/>
+          </a:xfrm>
+          <a:prstGeom prst="rect">
+            <a:avLst/>
+          </a:prstGeom>
+          <a:noFill/>
+          <a:ln w="9525">
+            <a:noFill/>
+            <a:headEnd/>
+            <a:tailEnd/>
+          </a:ln>
+        </p:spPr>
+      </p:pic>
+    </p:spTree>
+  </p:cSld>
+</p:sld>
+</file>
+
+<file path=ppt/slides/slide45.xml><?xml version="1.0" encoding="utf-8"?>
+<p:sld xmlns:a="http://schemas.openxmlformats.org/drawingml/2006/main" xmlns:r="http://schemas.openxmlformats.org/officeDocument/2006/relationships" xmlns:p="http://schemas.openxmlformats.org/presentationml/2006/main">
+  <p:cSld>
+    <p:spTree>
+      <p:nvGrpSpPr>
+        <p:cNvPr id="1" name=""/>
+        <p:cNvGrpSpPr/>
+        <p:nvPr/>
+      </p:nvGrpSpPr>
+      <p:grpSpPr>
+        <a:xfrm>
+          <a:off x="0" y="0"/>
+          <a:ext cx="0" cy="0"/>
+          <a:chOff x="0" y="0"/>
+          <a:chExt cx="0" cy="0"/>
+        </a:xfrm>
+      </p:grpSpPr>
+      <p:sp>
+        <p:nvSpPr>
+          <p:cNvPr id="2" name="Title 1"/>
+          <p:cNvSpPr>
+            <a:spLocks noGrp="1"/>
+          </p:cNvSpPr>
+          <p:nvPr>
+            <p:ph type="title"/>
+          </p:nvPr>
+        </p:nvSpPr>
+        <p:spPr/>
+        <p:txBody>
+          <a:bodyPr/>
+          <a:lstStyle/>
+          <a:p>
+            <a:pPr lvl="0" indent="0" marL="0">
+              <a:buNone/>
+            </a:pPr>
+            <a:r>
+              <a:rPr/>
+              <a:t>Summary</a:t>
+            </a:r>
+          </a:p>
+        </p:txBody>
+      </p:sp>
+      <p:sp>
+        <p:nvSpPr>
+          <p:cNvPr id="3" name="Content Placeholder 2"/>
+          <p:cNvSpPr>
+            <a:spLocks noGrp="1"/>
+          </p:cNvSpPr>
+          <p:nvPr>
+            <p:ph idx="1"/>
+          </p:nvPr>
+        </p:nvSpPr>
+        <p:spPr/>
+        <p:txBody>
+          <a:bodyPr/>
+          <a:lstStyle/>
+          <a:p>
+            <a:pPr lvl="0"/>
+            <a:r>
+              <a:rPr/>
+              <a:t>What you have learned</a:t>
+            </a:r>
+          </a:p>
+          <a:p>
+            <a:pPr lvl="1"/>
+            <a:r>
+              <a:rPr/>
+              <a:t>Use word of mouth</a:t>
+            </a:r>
+          </a:p>
+          <a:p>
+            <a:pPr lvl="1"/>
+            <a:r>
+              <a:rPr/>
+              <a:t>Give away free samples of your work</a:t>
+            </a:r>
+          </a:p>
+          <a:p>
+            <a:pPr lvl="1"/>
+            <a:r>
+              <a:rPr/>
+              <a:t>Consider volunteering</a:t>
+            </a:r>
+          </a:p>
+          <a:p>
+            <a:pPr lvl="1"/>
+            <a:r>
+              <a:rPr/>
+              <a:t>Recognize that not everyone will contact you by email</a:t>
+            </a:r>
+          </a:p>
+          <a:p>
+            <a:pPr lvl="1"/>
+            <a:r>
+              <a:rPr/>
+              <a:t>Turn all of these efforts into a regular work habit</a:t>
+            </a:r>
+          </a:p>
+          <a:p>
+            <a:pPr lvl="1"/>
+            <a:r>
+              <a:rPr/>
+              <a:t>Addendum: Keeping your existing customers happy</a:t>
+            </a:r>
+          </a:p>
+          <a:p>
+            <a:pPr lvl="0"/>
+            <a:r>
+              <a:rPr/>
+              <a:t>Any questions?</a:t>
+            </a:r>
+          </a:p>
+          <a:p>
+            <a:pPr lvl="0"/>
+            <a:r>
+              <a:rPr/>
+              <a:t>What have you found helpful?</a:t>
             </a:r>
           </a:p>
         </p:txBody>

</xml_diff>